<commit_message>
Update session numbers in presentations
</commit_message>
<xml_diff>
--- a/presentations/01_Introduction.pptx
+++ b/presentations/01_Introduction.pptx
@@ -284,7 +284,7 @@
           <a:p>
             <a:fld id="{646A4296-BBA3-4FCF-9A22-1B18C586F906}" type="datetimeFigureOut">
               <a:rPr lang="en-US" smtClean="0"/>
-              <a:t>09-Apr-22</a:t>
+              <a:t>15-Apr-22</a:t>
             </a:fld>
             <a:endParaRPr lang="en-US"/>
           </a:p>
@@ -482,7 +482,7 @@
           <a:p>
             <a:fld id="{646A4296-BBA3-4FCF-9A22-1B18C586F906}" type="datetimeFigureOut">
               <a:rPr lang="en-US" smtClean="0"/>
-              <a:t>09-Apr-22</a:t>
+              <a:t>15-Apr-22</a:t>
             </a:fld>
             <a:endParaRPr lang="en-US"/>
           </a:p>
@@ -690,7 +690,7 @@
           <a:p>
             <a:fld id="{646A4296-BBA3-4FCF-9A22-1B18C586F906}" type="datetimeFigureOut">
               <a:rPr lang="en-US" smtClean="0"/>
-              <a:t>09-Apr-22</a:t>
+              <a:t>15-Apr-22</a:t>
             </a:fld>
             <a:endParaRPr lang="en-US"/>
           </a:p>
@@ -888,7 +888,7 @@
           <a:p>
             <a:fld id="{646A4296-BBA3-4FCF-9A22-1B18C586F906}" type="datetimeFigureOut">
               <a:rPr lang="en-US" smtClean="0"/>
-              <a:t>09-Apr-22</a:t>
+              <a:t>15-Apr-22</a:t>
             </a:fld>
             <a:endParaRPr lang="en-US"/>
           </a:p>
@@ -1163,7 +1163,7 @@
           <a:p>
             <a:fld id="{646A4296-BBA3-4FCF-9A22-1B18C586F906}" type="datetimeFigureOut">
               <a:rPr lang="en-US" smtClean="0"/>
-              <a:t>09-Apr-22</a:t>
+              <a:t>15-Apr-22</a:t>
             </a:fld>
             <a:endParaRPr lang="en-US"/>
           </a:p>
@@ -1428,7 +1428,7 @@
           <a:p>
             <a:fld id="{646A4296-BBA3-4FCF-9A22-1B18C586F906}" type="datetimeFigureOut">
               <a:rPr lang="en-US" smtClean="0"/>
-              <a:t>09-Apr-22</a:t>
+              <a:t>15-Apr-22</a:t>
             </a:fld>
             <a:endParaRPr lang="en-US"/>
           </a:p>
@@ -1840,7 +1840,7 @@
           <a:p>
             <a:fld id="{646A4296-BBA3-4FCF-9A22-1B18C586F906}" type="datetimeFigureOut">
               <a:rPr lang="en-US" smtClean="0"/>
-              <a:t>09-Apr-22</a:t>
+              <a:t>15-Apr-22</a:t>
             </a:fld>
             <a:endParaRPr lang="en-US"/>
           </a:p>
@@ -1981,7 +1981,7 @@
           <a:p>
             <a:fld id="{646A4296-BBA3-4FCF-9A22-1B18C586F906}" type="datetimeFigureOut">
               <a:rPr lang="en-US" smtClean="0"/>
-              <a:t>09-Apr-22</a:t>
+              <a:t>15-Apr-22</a:t>
             </a:fld>
             <a:endParaRPr lang="en-US"/>
           </a:p>
@@ -2094,7 +2094,7 @@
           <a:p>
             <a:fld id="{646A4296-BBA3-4FCF-9A22-1B18C586F906}" type="datetimeFigureOut">
               <a:rPr lang="en-US" smtClean="0"/>
-              <a:t>09-Apr-22</a:t>
+              <a:t>15-Apr-22</a:t>
             </a:fld>
             <a:endParaRPr lang="en-US"/>
           </a:p>
@@ -2405,7 +2405,7 @@
           <a:p>
             <a:fld id="{646A4296-BBA3-4FCF-9A22-1B18C586F906}" type="datetimeFigureOut">
               <a:rPr lang="en-US" smtClean="0"/>
-              <a:t>09-Apr-22</a:t>
+              <a:t>15-Apr-22</a:t>
             </a:fld>
             <a:endParaRPr lang="en-US"/>
           </a:p>
@@ -2693,7 +2693,7 @@
           <a:p>
             <a:fld id="{646A4296-BBA3-4FCF-9A22-1B18C586F906}" type="datetimeFigureOut">
               <a:rPr lang="en-US" smtClean="0"/>
-              <a:t>09-Apr-22</a:t>
+              <a:t>15-Apr-22</a:t>
             </a:fld>
             <a:endParaRPr lang="en-US"/>
           </a:p>
@@ -2934,7 +2934,7 @@
           <a:p>
             <a:fld id="{646A4296-BBA3-4FCF-9A22-1B18C586F906}" type="datetimeFigureOut">
               <a:rPr lang="en-US" smtClean="0"/>
-              <a:t>09-Apr-22</a:t>
+              <a:t>15-Apr-22</a:t>
             </a:fld>
             <a:endParaRPr lang="en-US"/>
           </a:p>
@@ -3490,7 +3490,7 @@
             </a:pPr>
             <a:r>
               <a:rPr lang="en-US" dirty="0"/>
-              <a:t>Learning session 3</a:t>
+              <a:t>Learning session 4</a:t>
             </a:r>
           </a:p>
           <a:p>
@@ -3637,7 +3637,7 @@
             </a:pPr>
             <a:r>
               <a:rPr lang="en-US" dirty="0"/>
-              <a:t>Learning session 3</a:t>
+              <a:t>Learning session 4</a:t>
             </a:r>
           </a:p>
           <a:p>
@@ -3785,7 +3785,7 @@
             </a:pPr>
             <a:r>
               <a:rPr lang="en-US" dirty="0"/>
-              <a:t>Learning session 4</a:t>
+              <a:t>Learning session 5</a:t>
             </a:r>
           </a:p>
           <a:p>
@@ -3900,7 +3900,7 @@
             </a:pPr>
             <a:r>
               <a:rPr lang="en-US" dirty="0"/>
-              <a:t>Learning session 4</a:t>
+              <a:t>Learning session 5</a:t>
             </a:r>
           </a:p>
           <a:p>
@@ -4061,7 +4061,7 @@
             </a:pPr>
             <a:r>
               <a:rPr lang="en-US" dirty="0"/>
-              <a:t>Learning session 4</a:t>
+              <a:t>Learning session 5</a:t>
             </a:r>
           </a:p>
           <a:p>
@@ -4226,7 +4226,7 @@
             </a:pPr>
             <a:r>
               <a:rPr lang="en-US" dirty="0"/>
-              <a:t>Learning session 5</a:t>
+              <a:t>Learning session 6</a:t>
             </a:r>
           </a:p>
           <a:p>
@@ -5494,7 +5494,7 @@
             </a:pPr>
             <a:r>
               <a:rPr lang="en-US" dirty="0"/>
-              <a:t>Learning session 2</a:t>
+              <a:t>Learning session 2-3</a:t>
             </a:r>
           </a:p>
           <a:p>
@@ -5603,7 +5603,7 @@
             </a:pPr>
             <a:r>
               <a:rPr lang="en-US" dirty="0"/>
-              <a:t>Learning session 2</a:t>
+              <a:t>Learning session 2-3</a:t>
             </a:r>
           </a:p>
           <a:p>
@@ -5742,7 +5742,7 @@
             </a:pPr>
             <a:r>
               <a:rPr lang="en-US" dirty="0"/>
-              <a:t>Learning session 3</a:t>
+              <a:t>Learning session 4</a:t>
             </a:r>
           </a:p>
           <a:p>

</xml_diff>